<commit_message>
Correção da aula sobre design responsivo
</commit_message>
<xml_diff>
--- a/Aula10-Design Responsivo/Aula10-Design Responsivo.pptx
+++ b/Aula10-Design Responsivo/Aula10-Design Responsivo.pptx
@@ -21,26 +21,26 @@
   <p:notesSz cx="6858000" cy="9144000"/>
   <p:embeddedFontLst>
     <p:embeddedFont>
+      <p:font typeface="Poppins Ultra-Bold" panose="020B0604020202020204" charset="0"/>
+      <p:regular r:id="rId13"/>
+    </p:embeddedFont>
+    <p:embeddedFont>
+      <p:font typeface="Lato Bold" panose="020B0604020202020204" charset="0"/>
+      <p:regular r:id="rId14"/>
+    </p:embeddedFont>
+    <p:embeddedFont>
+      <p:font typeface="Lato" panose="020B0604020202020204" charset="0"/>
+      <p:regular r:id="rId15"/>
+    </p:embeddedFont>
+    <p:embeddedFont>
       <p:font typeface="Calibri" panose="020F0502020204030204" pitchFamily="34" charset="0"/>
-      <p:regular r:id="rId13"/>
-      <p:bold r:id="rId14"/>
-      <p:italic r:id="rId15"/>
-      <p:boldItalic r:id="rId16"/>
+      <p:regular r:id="rId16"/>
+      <p:bold r:id="rId17"/>
+      <p:italic r:id="rId18"/>
+      <p:boldItalic r:id="rId19"/>
     </p:embeddedFont>
     <p:embeddedFont>
       <p:font typeface="Poppins Bold" panose="020B0604020202020204" charset="0"/>
-      <p:regular r:id="rId17"/>
-    </p:embeddedFont>
-    <p:embeddedFont>
-      <p:font typeface="Poppins Ultra-Bold" panose="020B0604020202020204" charset="0"/>
-      <p:regular r:id="rId18"/>
-    </p:embeddedFont>
-    <p:embeddedFont>
-      <p:font typeface="Lato" panose="020B0604020202020204" charset="0"/>
-      <p:regular r:id="rId19"/>
-    </p:embeddedFont>
-    <p:embeddedFont>
-      <p:font typeface="Lato Bold" panose="020B0604020202020204" charset="0"/>
       <p:regular r:id="rId20"/>
     </p:embeddedFont>
   </p:embeddedFontLst>
@@ -338,7 +338,7 @@
             <a:fld id="{1D8BD707-D9CF-40AE-B4C6-C98DA3205C09}" type="datetimeFigureOut">
               <a:rPr lang="en-US" smtClean="0"/>
               <a:pPr/>
-              <a:t>3/9/2024</a:t>
+              <a:t>3/16/2024</a:t>
             </a:fld>
             <a:endParaRPr lang="en-US"/>
           </a:p>
@@ -503,7 +503,7 @@
             <a:fld id="{1D8BD707-D9CF-40AE-B4C6-C98DA3205C09}" type="datetimeFigureOut">
               <a:rPr lang="en-US" smtClean="0"/>
               <a:pPr/>
-              <a:t>3/9/2024</a:t>
+              <a:t>3/16/2024</a:t>
             </a:fld>
             <a:endParaRPr lang="en-US"/>
           </a:p>
@@ -678,7 +678,7 @@
             <a:fld id="{1D8BD707-D9CF-40AE-B4C6-C98DA3205C09}" type="datetimeFigureOut">
               <a:rPr lang="en-US" smtClean="0"/>
               <a:pPr/>
-              <a:t>3/9/2024</a:t>
+              <a:t>3/16/2024</a:t>
             </a:fld>
             <a:endParaRPr lang="en-US"/>
           </a:p>
@@ -843,7 +843,7 @@
             <a:fld id="{1D8BD707-D9CF-40AE-B4C6-C98DA3205C09}" type="datetimeFigureOut">
               <a:rPr lang="en-US" smtClean="0"/>
               <a:pPr/>
-              <a:t>3/9/2024</a:t>
+              <a:t>3/16/2024</a:t>
             </a:fld>
             <a:endParaRPr lang="en-US"/>
           </a:p>
@@ -1085,7 +1085,7 @@
             <a:fld id="{1D8BD707-D9CF-40AE-B4C6-C98DA3205C09}" type="datetimeFigureOut">
               <a:rPr lang="en-US" smtClean="0"/>
               <a:pPr/>
-              <a:t>3/9/2024</a:t>
+              <a:t>3/16/2024</a:t>
             </a:fld>
             <a:endParaRPr lang="en-US"/>
           </a:p>
@@ -1367,7 +1367,7 @@
             <a:fld id="{1D8BD707-D9CF-40AE-B4C6-C98DA3205C09}" type="datetimeFigureOut">
               <a:rPr lang="en-US" smtClean="0"/>
               <a:pPr/>
-              <a:t>3/9/2024</a:t>
+              <a:t>3/16/2024</a:t>
             </a:fld>
             <a:endParaRPr lang="en-US"/>
           </a:p>
@@ -1783,7 +1783,7 @@
             <a:fld id="{1D8BD707-D9CF-40AE-B4C6-C98DA3205C09}" type="datetimeFigureOut">
               <a:rPr lang="en-US" smtClean="0"/>
               <a:pPr/>
-              <a:t>3/9/2024</a:t>
+              <a:t>3/16/2024</a:t>
             </a:fld>
             <a:endParaRPr lang="en-US"/>
           </a:p>
@@ -1897,7 +1897,7 @@
             <a:fld id="{1D8BD707-D9CF-40AE-B4C6-C98DA3205C09}" type="datetimeFigureOut">
               <a:rPr lang="en-US" smtClean="0"/>
               <a:pPr/>
-              <a:t>3/9/2024</a:t>
+              <a:t>3/16/2024</a:t>
             </a:fld>
             <a:endParaRPr lang="en-US"/>
           </a:p>
@@ -1989,7 +1989,7 @@
             <a:fld id="{1D8BD707-D9CF-40AE-B4C6-C98DA3205C09}" type="datetimeFigureOut">
               <a:rPr lang="en-US" smtClean="0"/>
               <a:pPr/>
-              <a:t>3/9/2024</a:t>
+              <a:t>3/16/2024</a:t>
             </a:fld>
             <a:endParaRPr lang="en-US"/>
           </a:p>
@@ -2261,7 +2261,7 @@
             <a:fld id="{1D8BD707-D9CF-40AE-B4C6-C98DA3205C09}" type="datetimeFigureOut">
               <a:rPr lang="en-US" smtClean="0"/>
               <a:pPr/>
-              <a:t>3/9/2024</a:t>
+              <a:t>3/16/2024</a:t>
             </a:fld>
             <a:endParaRPr lang="en-US"/>
           </a:p>
@@ -2510,7 +2510,7 @@
             <a:fld id="{1D8BD707-D9CF-40AE-B4C6-C98DA3205C09}" type="datetimeFigureOut">
               <a:rPr lang="en-US" smtClean="0"/>
               <a:pPr/>
-              <a:t>3/9/2024</a:t>
+              <a:t>3/16/2024</a:t>
             </a:fld>
             <a:endParaRPr lang="en-US"/>
           </a:p>
@@ -2718,7 +2718,7 @@
             <a:fld id="{1D8BD707-D9CF-40AE-B4C6-C98DA3205C09}" type="datetimeFigureOut">
               <a:rPr lang="en-US" smtClean="0"/>
               <a:pPr/>
-              <a:t>3/9/2024</a:t>
+              <a:t>3/16/2024</a:t>
             </a:fld>
             <a:endParaRPr lang="en-US"/>
           </a:p>
@@ -3522,7 +3522,7 @@
               <a:alphaModFix amt="69000"/>
               <a:extLst>
                 <a:ext uri="{96DAC541-7B7A-43D3-8B79-37D633B846F1}">
-                  <asvg:svgBlip xmlns="" xmlns:asvg="http://schemas.microsoft.com/office/drawing/2016/SVG/main" r:embed="rId3"/>
+                  <asvg:svgBlip xmlns:asvg="http://schemas.microsoft.com/office/drawing/2016/SVG/main" xmlns="" r:embed="rId3"/>
                 </a:ext>
               </a:extLst>
             </a:blip>
@@ -3683,7 +3683,7 @@
         <p:spPr>
           <a:xfrm>
             <a:off x="816673" y="2247900"/>
-            <a:ext cx="16611599" cy="2246769"/>
+            <a:ext cx="16611599" cy="1169551"/>
           </a:xfrm>
           <a:prstGeom prst="rect">
             <a:avLst/>
@@ -3702,7 +3702,15 @@
                 <a:ea typeface="Lato" panose="020B0604020202020204" charset="0"/>
                 <a:cs typeface="Lato" panose="020B0604020202020204" charset="0"/>
               </a:rPr>
-              <a:t>O exemplo com o código-fonte completo </a:t>
+              <a:t>O exemplo com o código-fonte completo utilizando o </a:t>
+            </a:r>
+            <a:r>
+              <a:rPr lang="pt-BR" sz="3500" dirty="0" err="1" smtClean="0">
+                <a:latin typeface="Lato" panose="020B0604020202020204" charset="0"/>
+                <a:ea typeface="Lato" panose="020B0604020202020204" charset="0"/>
+                <a:cs typeface="Lato" panose="020B0604020202020204" charset="0"/>
+              </a:rPr>
+              <a:t>layoutBuilder</a:t>
             </a:r>
             <a:r>
               <a:rPr lang="pt-BR" sz="3500" dirty="0" smtClean="0">
@@ -3710,15 +3718,7 @@
                 <a:ea typeface="Lato" panose="020B0604020202020204" charset="0"/>
                 <a:cs typeface="Lato" panose="020B0604020202020204" charset="0"/>
               </a:rPr>
-              <a:t>utilizando o </a:t>
-            </a:r>
-            <a:r>
-              <a:rPr lang="pt-BR" sz="3500" dirty="0" err="1" smtClean="0">
-                <a:latin typeface="Lato" panose="020B0604020202020204" charset="0"/>
-                <a:ea typeface="Lato" panose="020B0604020202020204" charset="0"/>
-                <a:cs typeface="Lato" panose="020B0604020202020204" charset="0"/>
-              </a:rPr>
-              <a:t>layoutBuilder</a:t>
+              <a:t> </a:t>
             </a:r>
             <a:r>
               <a:rPr lang="pt-BR" sz="3500" dirty="0" smtClean="0">
@@ -3726,60 +3726,17 @@
                 <a:ea typeface="Lato" panose="020B0604020202020204" charset="0"/>
                 <a:cs typeface="Lato" panose="020B0604020202020204" charset="0"/>
               </a:rPr>
-              <a:t> está </a:t>
-            </a:r>
-            <a:r>
-              <a:rPr lang="pt-BR" sz="3500" dirty="0" smtClean="0">
-                <a:latin typeface="Lato" panose="020B0604020202020204" charset="0"/>
-                <a:ea typeface="Lato" panose="020B0604020202020204" charset="0"/>
-                <a:cs typeface="Lato" panose="020B0604020202020204" charset="0"/>
-              </a:rPr>
-              <a:t>disponível no seguinte link</a:t>
-            </a:r>
-            <a:r>
-              <a:rPr lang="pt-BR" sz="3500" dirty="0">
-                <a:latin typeface="Lato" panose="020B0604020202020204" charset="0"/>
-                <a:ea typeface="Lato" panose="020B0604020202020204" charset="0"/>
-                <a:cs typeface="Lato" panose="020B0604020202020204" charset="0"/>
-              </a:rPr>
-              <a:t>: </a:t>
-            </a:r>
-            <a:r>
-              <a:rPr lang="pt-BR" sz="3500" dirty="0" smtClean="0">
-                <a:latin typeface="Lato" panose="020B0604020202020204" charset="0"/>
-                <a:ea typeface="Lato" panose="020B0604020202020204" charset="0"/>
-                <a:cs typeface="Lato" panose="020B0604020202020204" charset="0"/>
-                <a:hlinkClick r:id="rId2"/>
-              </a:rPr>
-              <a:t>https</a:t>
-            </a:r>
-            <a:r>
-              <a:rPr lang="pt-BR" sz="3500" dirty="0">
-                <a:latin typeface="Lato" panose="020B0604020202020204" charset="0"/>
-                <a:ea typeface="Lato" panose="020B0604020202020204" charset="0"/>
-                <a:cs typeface="Lato" panose="020B0604020202020204" charset="0"/>
-                <a:hlinkClick r:id="rId2"/>
-              </a:rPr>
-              <a:t>://</a:t>
-            </a:r>
-            <a:r>
-              <a:rPr lang="pt-BR" sz="3500" dirty="0" smtClean="0">
-                <a:latin typeface="Lato" panose="020B0604020202020204" charset="0"/>
-                <a:ea typeface="Lato" panose="020B0604020202020204" charset="0"/>
-                <a:cs typeface="Lato" panose="020B0604020202020204" charset="0"/>
-                <a:hlinkClick r:id="rId2"/>
-              </a:rPr>
-              <a:t>github.com/marcosdosea/TreinamentoFlutter/blob/main/Aula10-Design%20Responsivo/layoutBuilder.dart</a:t>
-            </a:r>
-            <a:r>
-              <a:rPr lang="pt-BR" sz="3500" dirty="0" smtClean="0">
-                <a:latin typeface="Lato" panose="020B0604020202020204" charset="0"/>
-                <a:ea typeface="Lato" panose="020B0604020202020204" charset="0"/>
-                <a:cs typeface="Lato" panose="020B0604020202020204" charset="0"/>
-              </a:rPr>
-              <a:t>.</a:t>
-            </a:r>
-            <a:endParaRPr lang="pt-BR" sz="3500" dirty="0">
+              <a:t>encontra-se no arquivo </a:t>
+            </a:r>
+            <a:r>
+              <a:rPr lang="pt-BR" sz="3500" b="1" dirty="0" err="1" smtClean="0">
+                <a:latin typeface="Lato" panose="020B0604020202020204" charset="0"/>
+                <a:ea typeface="Lato" panose="020B0604020202020204" charset="0"/>
+                <a:cs typeface="Lato" panose="020B0604020202020204" charset="0"/>
+              </a:rPr>
+              <a:t>layoutBuilder.dart</a:t>
+            </a:r>
+            <a:endParaRPr lang="pt-BR" sz="3500" b="1" dirty="0">
               <a:latin typeface="Lato" panose="020B0604020202020204" charset="0"/>
               <a:ea typeface="Lato" panose="020B0604020202020204" charset="0"/>
               <a:cs typeface="Lato" panose="020B0604020202020204" charset="0"/>
@@ -4900,16 +4857,7 @@
                 </a:solidFill>
                 <a:latin typeface="Lato Bold"/>
               </a:rPr>
-              <a:t> </a:t>
-            </a:r>
-            <a:r>
-              <a:rPr lang="en-US" sz="3500" spc="350" dirty="0" smtClean="0">
-                <a:solidFill>
-                  <a:srgbClr val="2B4A9D"/>
-                </a:solidFill>
-                <a:latin typeface="Lato Bold"/>
-              </a:rPr>
-              <a:t>x </a:t>
+              <a:t> x </a:t>
             </a:r>
             <a:r>
               <a:rPr lang="en-US" sz="3500" spc="350" dirty="0" err="1" smtClean="0">
@@ -11245,29 +11193,7 @@
                 <a:ea typeface="Lato" panose="020B0604020202020204" charset="0"/>
                 <a:cs typeface="Lato" panose="020B0604020202020204" charset="0"/>
               </a:rPr>
-              <a:t>4. </a:t>
-            </a:r>
-            <a:r>
-              <a:rPr lang="en-US" sz="3399" spc="339" dirty="0" smtClean="0">
-                <a:solidFill>
-                  <a:srgbClr val="000000"/>
-                </a:solidFill>
-                <a:latin typeface="Lato" panose="020B0604020202020204" charset="0"/>
-                <a:ea typeface="Lato" panose="020B0604020202020204" charset="0"/>
-                <a:cs typeface="Lato" panose="020B0604020202020204" charset="0"/>
-              </a:rPr>
-              <a:t>Orientation: </a:t>
-            </a:r>
-            <a:r>
-              <a:rPr lang="en-US" sz="3399" spc="339" dirty="0" smtClean="0">
-                <a:solidFill>
-                  <a:srgbClr val="000000"/>
-                </a:solidFill>
-                <a:latin typeface="Lato" panose="020B0604020202020204" charset="0"/>
-                <a:ea typeface="Lato" panose="020B0604020202020204" charset="0"/>
-                <a:cs typeface="Lato" panose="020B0604020202020204" charset="0"/>
-              </a:rPr>
-              <a:t>define a </a:t>
+              <a:t>4. Orientation: define a </a:t>
             </a:r>
             <a:r>
               <a:rPr lang="en-US" sz="3399" spc="339" dirty="0" err="1" smtClean="0">

</xml_diff>